<commit_message>
Added Session02 and example website
</commit_message>
<xml_diff>
--- a/Session01/Web Basics and HTML.pptx
+++ b/Session01/Web Basics and HTML.pptx
@@ -229,7 +229,7 @@
           <a:p>
             <a:fld id="{E0B970EE-3970-41ED-A829-BC78247B6CA2}" type="datetimeFigureOut">
               <a:rPr lang="en-US" smtClean="0"/>
-              <a:t>9/3/2014</a:t>
+              <a:t>9/4/2014</a:t>
             </a:fld>
             <a:endParaRPr lang="en-US"/>
           </a:p>
@@ -678,7 +678,7 @@
           <a:p>
             <a:fld id="{B530A06F-4A42-46F5-81D9-25A59BEC15D1}" type="datetime1">
               <a:rPr lang="en-GB" smtClean="0"/>
-              <a:t>03/09/2014</a:t>
+              <a:t>04/09/2014</a:t>
             </a:fld>
             <a:endParaRPr lang="en-US"/>
           </a:p>
@@ -852,7 +852,7 @@
           <a:p>
             <a:fld id="{DFC0F407-45DC-4B2F-A1EE-F2CA78847B83}" type="datetime1">
               <a:rPr lang="en-GB" smtClean="0"/>
-              <a:t>03/09/2014</a:t>
+              <a:t>04/09/2014</a:t>
             </a:fld>
             <a:endParaRPr lang="en-US"/>
           </a:p>
@@ -1036,7 +1036,7 @@
           <a:p>
             <a:fld id="{15FFC99E-AE96-435F-A374-C7356990EC67}" type="datetime1">
               <a:rPr lang="en-GB" smtClean="0"/>
-              <a:t>03/09/2014</a:t>
+              <a:t>04/09/2014</a:t>
             </a:fld>
             <a:endParaRPr lang="en-US"/>
           </a:p>
@@ -1210,7 +1210,7 @@
           <a:p>
             <a:fld id="{FD99DDDE-5416-4882-8BCE-91DDFD9E38CA}" type="datetime1">
               <a:rPr lang="en-GB" smtClean="0"/>
-              <a:t>03/09/2014</a:t>
+              <a:t>04/09/2014</a:t>
             </a:fld>
             <a:endParaRPr lang="en-US"/>
           </a:p>
@@ -1460,7 +1460,7 @@
           <a:p>
             <a:fld id="{68C69F6D-A580-45AA-B3B1-4F2724B7A148}" type="datetime1">
               <a:rPr lang="en-GB" smtClean="0"/>
-              <a:t>03/09/2014</a:t>
+              <a:t>04/09/2014</a:t>
             </a:fld>
             <a:endParaRPr lang="en-US"/>
           </a:p>
@@ -1752,7 +1752,7 @@
           <a:p>
             <a:fld id="{6B6372D9-C5CE-4687-9E40-793373A3C25F}" type="datetime1">
               <a:rPr lang="en-GB" smtClean="0"/>
-              <a:t>03/09/2014</a:t>
+              <a:t>04/09/2014</a:t>
             </a:fld>
             <a:endParaRPr lang="en-US"/>
           </a:p>
@@ -2178,7 +2178,7 @@
           <a:p>
             <a:fld id="{727A09A2-FE30-46E7-81F1-42FAB505D98A}" type="datetime1">
               <a:rPr lang="en-GB" smtClean="0"/>
-              <a:t>03/09/2014</a:t>
+              <a:t>04/09/2014</a:t>
             </a:fld>
             <a:endParaRPr lang="en-US"/>
           </a:p>
@@ -2300,7 +2300,7 @@
           <a:p>
             <a:fld id="{7D892897-DEA8-4C57-B14D-ADD640149645}" type="datetime1">
               <a:rPr lang="en-GB" smtClean="0"/>
-              <a:t>03/09/2014</a:t>
+              <a:t>04/09/2014</a:t>
             </a:fld>
             <a:endParaRPr lang="en-US"/>
           </a:p>
@@ -2399,7 +2399,7 @@
           <a:p>
             <a:fld id="{31D867C2-B480-4739-BBF7-793C27CBF95C}" type="datetime1">
               <a:rPr lang="en-GB" smtClean="0"/>
-              <a:t>03/09/2014</a:t>
+              <a:t>04/09/2014</a:t>
             </a:fld>
             <a:endParaRPr lang="en-US"/>
           </a:p>
@@ -2680,7 +2680,7 @@
           <a:p>
             <a:fld id="{358FF543-2ADD-4F00-B4F0-D75E61A6B4B3}" type="datetime1">
               <a:rPr lang="en-GB" smtClean="0"/>
-              <a:t>03/09/2014</a:t>
+              <a:t>04/09/2014</a:t>
             </a:fld>
             <a:endParaRPr lang="en-US"/>
           </a:p>
@@ -2937,7 +2937,7 @@
           <a:p>
             <a:fld id="{AD14AE3E-B44D-4498-9281-FBA04B2CFD99}" type="datetime1">
               <a:rPr lang="en-GB" smtClean="0"/>
-              <a:t>03/09/2014</a:t>
+              <a:t>04/09/2014</a:t>
             </a:fld>
             <a:endParaRPr lang="en-US"/>
           </a:p>
@@ -3154,7 +3154,7 @@
           <a:p>
             <a:fld id="{B0247478-78DB-4808-B7D0-AC2E076BE85F}" type="datetime1">
               <a:rPr lang="en-GB" smtClean="0"/>
-              <a:t>03/09/2014</a:t>
+              <a:t>04/09/2014</a:t>
             </a:fld>
             <a:endParaRPr lang="en-US"/>
           </a:p>
@@ -3657,6 +3657,13 @@
   <p:clrMapOvr>
     <a:masterClrMapping/>
   </p:clrMapOvr>
+  <p:timing>
+    <p:tnLst>
+      <p:par>
+        <p:cTn id="1" dur="indefinite" restart="never" nodeType="tmRoot"/>
+      </p:par>
+    </p:tnLst>
+  </p:timing>
 </p:sld>
 </file>
 
@@ -3887,6 +3894,13 @@
   <p:clrMapOvr>
     <a:masterClrMapping/>
   </p:clrMapOvr>
+  <p:timing>
+    <p:tnLst>
+      <p:par>
+        <p:cTn id="1" dur="indefinite" restart="never" nodeType="tmRoot"/>
+      </p:par>
+    </p:tnLst>
+  </p:timing>
 </p:sld>
 </file>
 
@@ -4338,6 +4352,13 @@
   <p:clrMapOvr>
     <a:masterClrMapping/>
   </p:clrMapOvr>
+  <p:timing>
+    <p:tnLst>
+      <p:par>
+        <p:cTn id="1" dur="indefinite" restart="never" nodeType="tmRoot"/>
+      </p:par>
+    </p:tnLst>
+  </p:timing>
 </p:sld>
 </file>
 
@@ -4523,6 +4544,13 @@
   <p:clrMapOvr>
     <a:masterClrMapping/>
   </p:clrMapOvr>
+  <p:timing>
+    <p:tnLst>
+      <p:par>
+        <p:cTn id="1" dur="indefinite" restart="never" nodeType="tmRoot"/>
+      </p:par>
+    </p:tnLst>
+  </p:timing>
 </p:sld>
 </file>
 
@@ -4715,6 +4743,13 @@
   <p:clrMapOvr>
     <a:masterClrMapping/>
   </p:clrMapOvr>
+  <p:timing>
+    <p:tnLst>
+      <p:par>
+        <p:cTn id="1" dur="indefinite" restart="never" nodeType="tmRoot"/>
+      </p:par>
+    </p:tnLst>
+  </p:timing>
 </p:sld>
 </file>
 
@@ -4862,6 +4897,13 @@
   <p:clrMapOvr>
     <a:masterClrMapping/>
   </p:clrMapOvr>
+  <p:timing>
+    <p:tnLst>
+      <p:par>
+        <p:cTn id="1" dur="indefinite" restart="never" nodeType="tmRoot"/>
+      </p:par>
+    </p:tnLst>
+  </p:timing>
 </p:sld>
 </file>
 
@@ -5029,6 +5071,13 @@
   <p:clrMapOvr>
     <a:masterClrMapping/>
   </p:clrMapOvr>
+  <p:timing>
+    <p:tnLst>
+      <p:par>
+        <p:cTn id="1" dur="indefinite" restart="never" nodeType="tmRoot"/>
+      </p:par>
+    </p:tnLst>
+  </p:timing>
 </p:sld>
 </file>
 
@@ -5141,6 +5190,13 @@
   <p:clrMapOvr>
     <a:masterClrMapping/>
   </p:clrMapOvr>
+  <p:timing>
+    <p:tnLst>
+      <p:par>
+        <p:cTn id="1" dur="indefinite" restart="never" nodeType="tmRoot"/>
+      </p:par>
+    </p:tnLst>
+  </p:timing>
 </p:sld>
 </file>
 
@@ -5362,6 +5418,13 @@
   <p:clrMapOvr>
     <a:masterClrMapping/>
   </p:clrMapOvr>
+  <p:timing>
+    <p:tnLst>
+      <p:par>
+        <p:cTn id="1" dur="indefinite" restart="never" nodeType="tmRoot"/>
+      </p:par>
+    </p:tnLst>
+  </p:timing>
 </p:sld>
 </file>
 
@@ -5678,6 +5741,13 @@
   <p:clrMapOvr>
     <a:masterClrMapping/>
   </p:clrMapOvr>
+  <p:timing>
+    <p:tnLst>
+      <p:par>
+        <p:cTn id="1" dur="indefinite" restart="never" nodeType="tmRoot"/>
+      </p:par>
+    </p:tnLst>
+  </p:timing>
 </p:sld>
 </file>
 
@@ -6085,6 +6155,13 @@
   <p:clrMapOvr>
     <a:masterClrMapping/>
   </p:clrMapOvr>
+  <p:timing>
+    <p:tnLst>
+      <p:par>
+        <p:cTn id="1" dur="indefinite" restart="never" nodeType="tmRoot"/>
+      </p:par>
+    </p:tnLst>
+  </p:timing>
 </p:sld>
 </file>
 
@@ -6184,6 +6261,13 @@
   <p:clrMapOvr>
     <a:masterClrMapping/>
   </p:clrMapOvr>
+  <p:timing>
+    <p:tnLst>
+      <p:par>
+        <p:cTn id="1" dur="indefinite" restart="never" nodeType="tmRoot"/>
+      </p:par>
+    </p:tnLst>
+  </p:timing>
 </p:sld>
 </file>
 
@@ -6460,6 +6544,13 @@
   <p:clrMapOvr>
     <a:masterClrMapping/>
   </p:clrMapOvr>
+  <p:timing>
+    <p:tnLst>
+      <p:par>
+        <p:cTn id="1" dur="indefinite" restart="never" nodeType="tmRoot"/>
+      </p:par>
+    </p:tnLst>
+  </p:timing>
 </p:sld>
 </file>
 
@@ -6762,6 +6853,13 @@
   <p:clrMapOvr>
     <a:masterClrMapping/>
   </p:clrMapOvr>
+  <p:timing>
+    <p:tnLst>
+      <p:par>
+        <p:cTn id="1" dur="indefinite" restart="never" nodeType="tmRoot"/>
+      </p:par>
+    </p:tnLst>
+  </p:timing>
 </p:sld>
 </file>
 
@@ -7084,6 +7182,13 @@
   <p:clrMapOvr>
     <a:masterClrMapping/>
   </p:clrMapOvr>
+  <p:timing>
+    <p:tnLst>
+      <p:par>
+        <p:cTn id="1" dur="indefinite" restart="never" nodeType="tmRoot"/>
+      </p:par>
+    </p:tnLst>
+  </p:timing>
 </p:sld>
 </file>
 
@@ -7407,6 +7512,13 @@
   <p:clrMapOvr>
     <a:masterClrMapping/>
   </p:clrMapOvr>
+  <p:timing>
+    <p:tnLst>
+      <p:par>
+        <p:cTn id="1" dur="indefinite" restart="never" nodeType="tmRoot"/>
+      </p:par>
+    </p:tnLst>
+  </p:timing>
 </p:sld>
 </file>
 
@@ -7604,6 +7716,13 @@
   <p:clrMapOvr>
     <a:masterClrMapping/>
   </p:clrMapOvr>
+  <p:timing>
+    <p:tnLst>
+      <p:par>
+        <p:cTn id="1" dur="indefinite" restart="never" nodeType="tmRoot"/>
+      </p:par>
+    </p:tnLst>
+  </p:timing>
 </p:sld>
 </file>
 
@@ -7741,6 +7860,13 @@
   <p:clrMapOvr>
     <a:masterClrMapping/>
   </p:clrMapOvr>
+  <p:timing>
+    <p:tnLst>
+      <p:par>
+        <p:cTn id="1" dur="indefinite" restart="never" nodeType="tmRoot"/>
+      </p:par>
+    </p:tnLst>
+  </p:timing>
 </p:sld>
 </file>
 
@@ -7846,6 +7972,13 @@
   <p:clrMapOvr>
     <a:masterClrMapping/>
   </p:clrMapOvr>
+  <p:timing>
+    <p:tnLst>
+      <p:par>
+        <p:cTn id="1" dur="indefinite" restart="never" nodeType="tmRoot"/>
+      </p:par>
+    </p:tnLst>
+  </p:timing>
 </p:sld>
 </file>
 
@@ -8244,6 +8377,13 @@
   <p:clrMapOvr>
     <a:masterClrMapping/>
   </p:clrMapOvr>
+  <p:timing>
+    <p:tnLst>
+      <p:par>
+        <p:cTn id="1" dur="indefinite" restart="never" nodeType="tmRoot"/>
+      </p:par>
+    </p:tnLst>
+  </p:timing>
 </p:sld>
 </file>
 
@@ -9123,6 +9263,13 @@
   <p:clrMapOvr>
     <a:masterClrMapping/>
   </p:clrMapOvr>
+  <p:timing>
+    <p:tnLst>
+      <p:par>
+        <p:cTn id="1" dur="indefinite" restart="never" nodeType="tmRoot"/>
+      </p:par>
+    </p:tnLst>
+  </p:timing>
 </p:sld>
 </file>
 
@@ -9968,6 +10115,13 @@
   <p:clrMapOvr>
     <a:masterClrMapping/>
   </p:clrMapOvr>
+  <p:timing>
+    <p:tnLst>
+      <p:par>
+        <p:cTn id="1" dur="indefinite" restart="never" nodeType="tmRoot"/>
+      </p:par>
+    </p:tnLst>
+  </p:timing>
 </p:sld>
 </file>
 
@@ -10007,11 +10161,7 @@
           <a:p>
             <a:r>
               <a:rPr lang="en-US" dirty="0" smtClean="0"/>
-              <a:t>WWW – </a:t>
-            </a:r>
-            <a:r>
-              <a:rPr lang="en-US" dirty="0" smtClean="0"/>
-              <a:t>Pages</a:t>
+              <a:t>WWW – Pages</a:t>
             </a:r>
             <a:endParaRPr lang="en-US" dirty="0"/>
           </a:p>
@@ -10036,11 +10186,7 @@
           <a:p>
             <a:r>
               <a:rPr lang="en-US" dirty="0" smtClean="0"/>
-              <a:t>Page </a:t>
-            </a:r>
-            <a:r>
-              <a:rPr lang="en-US" dirty="0" smtClean="0"/>
-              <a:t>can contain many different types of information; page must specify:</a:t>
+              <a:t>Page can contain many different types of information; page must specify:</a:t>
             </a:r>
           </a:p>
           <a:p>
@@ -10054,15 +10200,7 @@
             <a:pPr lvl="1"/>
             <a:r>
               <a:rPr lang="en-US" dirty="0" smtClean="0"/>
-              <a:t>Type of content – The type of information, e.g. </a:t>
-            </a:r>
-            <a:r>
-              <a:rPr lang="en-US" dirty="0" smtClean="0"/>
-              <a:t>t</a:t>
-            </a:r>
-            <a:r>
-              <a:rPr lang="en-US" dirty="0" smtClean="0"/>
-              <a:t>ext </a:t>
+              <a:t>Type of content – The type of information, e.g. text </a:t>
             </a:r>
             <a:r>
               <a:rPr lang="en-US" dirty="0"/>
@@ -10070,23 +10208,14 @@
             </a:r>
             <a:r>
               <a:rPr lang="en-US" dirty="0" smtClean="0"/>
-              <a:t>Video </a:t>
-            </a:r>
-            <a:r>
-              <a:rPr lang="en-US" dirty="0" smtClean="0"/>
-              <a:t>etc.</a:t>
-            </a:r>
-            <a:endParaRPr lang="en-US" dirty="0" smtClean="0"/>
+              <a:t>Video etc.</a:t>
+            </a:r>
           </a:p>
           <a:p>
             <a:pPr lvl="1"/>
             <a:r>
               <a:rPr lang="en-US" dirty="0" smtClean="0"/>
-              <a:t>Links to other </a:t>
-            </a:r>
-            <a:r>
-              <a:rPr lang="en-US" dirty="0" smtClean="0"/>
-              <a:t>pages</a:t>
+              <a:t>Links to other pages</a:t>
             </a:r>
           </a:p>
           <a:p>
@@ -10128,7 +10257,6 @@
               <a:rPr lang="en-US" dirty="0" smtClean="0"/>
               <a:t>.</a:t>
             </a:r>
-            <a:endParaRPr lang="en-US" dirty="0" smtClean="0"/>
           </a:p>
           <a:p>
             <a:r>
@@ -10186,6 +10314,13 @@
   <p:clrMapOvr>
     <a:masterClrMapping/>
   </p:clrMapOvr>
+  <p:timing>
+    <p:tnLst>
+      <p:par>
+        <p:cTn id="1" dur="indefinite" restart="never" nodeType="tmRoot"/>
+      </p:par>
+    </p:tnLst>
+  </p:timing>
 </p:sld>
 </file>
 
@@ -10436,6 +10571,13 @@
   <p:clrMapOvr>
     <a:masterClrMapping/>
   </p:clrMapOvr>
+  <p:timing>
+    <p:tnLst>
+      <p:par>
+        <p:cTn id="1" dur="indefinite" restart="never" nodeType="tmRoot"/>
+      </p:par>
+    </p:tnLst>
+  </p:timing>
 </p:sld>
 </file>
 
@@ -10585,6 +10727,13 @@
   <p:clrMapOvr>
     <a:masterClrMapping/>
   </p:clrMapOvr>
+  <p:timing>
+    <p:tnLst>
+      <p:par>
+        <p:cTn id="1" dur="indefinite" restart="never" nodeType="tmRoot"/>
+      </p:par>
+    </p:tnLst>
+  </p:timing>
 </p:sld>
 </file>
 
@@ -10721,6 +10870,13 @@
   <p:clrMapOvr>
     <a:masterClrMapping/>
   </p:clrMapOvr>
+  <p:timing>
+    <p:tnLst>
+      <p:par>
+        <p:cTn id="1" dur="indefinite" restart="never" nodeType="tmRoot"/>
+      </p:par>
+    </p:tnLst>
+  </p:timing>
 </p:sld>
 </file>
 
@@ -10868,6 +11024,13 @@
   <p:clrMapOvr>
     <a:masterClrMapping/>
   </p:clrMapOvr>
+  <p:timing>
+    <p:tnLst>
+      <p:par>
+        <p:cTn id="1" dur="indefinite" restart="never" nodeType="tmRoot"/>
+      </p:par>
+    </p:tnLst>
+  </p:timing>
 </p:sld>
 </file>
 
@@ -10981,6 +11144,13 @@
   <p:clrMapOvr>
     <a:masterClrMapping/>
   </p:clrMapOvr>
+  <p:timing>
+    <p:tnLst>
+      <p:par>
+        <p:cTn id="1" dur="indefinite" restart="never" nodeType="tmRoot"/>
+      </p:par>
+    </p:tnLst>
+  </p:timing>
 </p:sld>
 </file>
 
@@ -11181,6 +11351,13 @@
   <p:clrMapOvr>
     <a:masterClrMapping/>
   </p:clrMapOvr>
+  <p:timing>
+    <p:tnLst>
+      <p:par>
+        <p:cTn id="1" dur="indefinite" restart="never" nodeType="tmRoot"/>
+      </p:par>
+    </p:tnLst>
+  </p:timing>
 </p:sld>
 </file>
 
@@ -11340,6 +11517,13 @@
   <p:clrMapOvr>
     <a:masterClrMapping/>
   </p:clrMapOvr>
+  <p:timing>
+    <p:tnLst>
+      <p:par>
+        <p:cTn id="1" dur="indefinite" restart="never" nodeType="tmRoot"/>
+      </p:par>
+    </p:tnLst>
+  </p:timing>
 </p:sld>
 </file>
 
@@ -11876,6 +12060,13 @@
   <p:clrMapOvr>
     <a:masterClrMapping/>
   </p:clrMapOvr>
+  <p:timing>
+    <p:tnLst>
+      <p:par>
+        <p:cTn id="1" dur="indefinite" restart="never" nodeType="tmRoot"/>
+      </p:par>
+    </p:tnLst>
+  </p:timing>
 </p:sld>
 </file>
 
@@ -11987,6 +12178,13 @@
   <p:clrMapOvr>
     <a:masterClrMapping/>
   </p:clrMapOvr>
+  <p:timing>
+    <p:tnLst>
+      <p:par>
+        <p:cTn id="1" dur="indefinite" restart="never" nodeType="tmRoot"/>
+      </p:par>
+    </p:tnLst>
+  </p:timing>
 </p:sld>
 </file>
 
@@ -12051,21 +12249,8 @@
           <a:p>
             <a:r>
               <a:rPr lang="en-US" dirty="0" smtClean="0"/>
-              <a:t>Each </a:t>
-            </a:r>
-            <a:r>
-              <a:rPr lang="en-US" dirty="0" smtClean="0"/>
-              <a:t>page contains </a:t>
-            </a:r>
-            <a:r>
-              <a:rPr lang="en-US" dirty="0" smtClean="0"/>
-              <a:t>links (pointers) to other </a:t>
-            </a:r>
-            <a:r>
-              <a:rPr lang="en-US" dirty="0" smtClean="0"/>
-              <a:t>pages.</a:t>
-            </a:r>
-            <a:endParaRPr lang="en-US" dirty="0" smtClean="0"/>
+              <a:t>Each page contains links (pointers) to other pages.</a:t>
+            </a:r>
           </a:p>
           <a:p>
             <a:r>
@@ -12090,15 +12275,7 @@
           <a:p>
             <a:r>
               <a:rPr lang="en-US" dirty="0" smtClean="0"/>
-              <a:t>By selecting a particular link, the client fetches the referenced </a:t>
-            </a:r>
-            <a:r>
-              <a:rPr lang="en-US" dirty="0" smtClean="0"/>
-              <a:t>page from </a:t>
-            </a:r>
-            <a:r>
-              <a:rPr lang="en-US" dirty="0" smtClean="0"/>
-              <a:t>a server for display.</a:t>
+              <a:t>By selecting a particular link, the client fetches the referenced page from a server for display.</a:t>
             </a:r>
           </a:p>
           <a:p>
@@ -12111,27 +12288,14 @@
             <a:pPr lvl="1"/>
             <a:r>
               <a:rPr lang="en-US" dirty="0" smtClean="0"/>
-              <a:t>Link is simply a text name for a remote </a:t>
-            </a:r>
-            <a:r>
-              <a:rPr lang="en-US" dirty="0" smtClean="0"/>
-              <a:t>page.</a:t>
-            </a:r>
-            <a:endParaRPr lang="en-US" dirty="0" smtClean="0"/>
+              <a:t>Link is simply a text name for a remote page.</a:t>
+            </a:r>
           </a:p>
           <a:p>
             <a:pPr lvl="1"/>
             <a:r>
               <a:rPr lang="en-US" dirty="0" smtClean="0"/>
-              <a:t>Remote </a:t>
-            </a:r>
-            <a:r>
-              <a:rPr lang="en-US" dirty="0" smtClean="0"/>
-              <a:t>pages may </a:t>
-            </a:r>
-            <a:r>
-              <a:rPr lang="en-US" dirty="0" smtClean="0"/>
-              <a:t>be moved to a new location while name in link remains in place.</a:t>
+              <a:t>Remote pages may be moved to a new location while name in link remains in place.</a:t>
             </a:r>
           </a:p>
           <a:p>
@@ -12149,6 +12313,13 @@
   <p:clrMapOvr>
     <a:masterClrMapping/>
   </p:clrMapOvr>
+  <p:timing>
+    <p:tnLst>
+      <p:par>
+        <p:cTn id="1" dur="indefinite" restart="never" nodeType="tmRoot"/>
+      </p:par>
+    </p:tnLst>
+  </p:timing>
 </p:sld>
 </file>
 
@@ -12323,6 +12494,13 @@
   <p:clrMapOvr>
     <a:masterClrMapping/>
   </p:clrMapOvr>
+  <p:timing>
+    <p:tnLst>
+      <p:par>
+        <p:cTn id="1" dur="indefinite" restart="never" nodeType="tmRoot"/>
+      </p:par>
+    </p:tnLst>
+  </p:timing>
 </p:sld>
 </file>
 
@@ -12736,6 +12914,13 @@
   <p:clrMapOvr>
     <a:masterClrMapping/>
   </p:clrMapOvr>
+  <p:timing>
+    <p:tnLst>
+      <p:par>
+        <p:cTn id="1" dur="indefinite" restart="never" nodeType="tmRoot"/>
+      </p:par>
+    </p:tnLst>
+  </p:timing>
 </p:sld>
 </file>
 
@@ -12989,7 +13174,6 @@
               <a:rPr lang="en-US" dirty="0" smtClean="0"/>
               <a:t>Add</a:t>
             </a:r>
-            <a:endParaRPr lang="en-US" dirty="0" smtClean="0"/>
           </a:p>
           <a:p>
             <a:r>
@@ -13351,6 +13535,13 @@
   <p:clrMapOvr>
     <a:masterClrMapping/>
   </p:clrMapOvr>
+  <p:timing>
+    <p:tnLst>
+      <p:par>
+        <p:cTn id="1" dur="indefinite" restart="never" nodeType="tmRoot"/>
+      </p:par>
+    </p:tnLst>
+  </p:timing>
 </p:sld>
 </file>
 
@@ -13597,6 +13788,13 @@
   <p:clrMapOvr>
     <a:masterClrMapping/>
   </p:clrMapOvr>
+  <p:timing>
+    <p:tnLst>
+      <p:par>
+        <p:cTn id="1" dur="indefinite" restart="never" nodeType="tmRoot"/>
+      </p:par>
+    </p:tnLst>
+  </p:timing>
 </p:sld>
 </file>
 

</xml_diff>